<commit_message>
Simple join examples in mismatches.Rmd
</commit_message>
<xml_diff>
--- a/src/mismatches.pptx
+++ b/src/mismatches.pptx
@@ -5,7 +5,7 @@
     <p:sldMasterId id="2147483648" r:id="rId1"/>
   </p:sldMasterIdLst>
   <p:notesMasterIdLst>
-    <p:NotesMasterId r:id="rId7"/>
+    <p:NotesMasterId r:id="rId17"/>
   </p:notesMasterIdLst>
   <p:sldIdLst>
     <p:sldId id="256" r:id="rId2"/>
@@ -13,6 +13,16 @@
     <p:sldId id="258" r:id="rId4"/>
     <p:sldId id="259" r:id="rId5"/>
     <p:sldId id="260" r:id="rId6"/>
+    <p:sldId id="261" r:id="rId7"/>
+    <p:sldId id="262" r:id="rId8"/>
+    <p:sldId id="263" r:id="rId9"/>
+    <p:sldId id="264" r:id="rId10"/>
+    <p:sldId id="265" r:id="rId11"/>
+    <p:sldId id="266" r:id="rId12"/>
+    <p:sldId id="267" r:id="rId13"/>
+    <p:sldId id="268" r:id="rId14"/>
+    <p:sldId id="269" r:id="rId15"/>
+    <p:sldId id="270" r:id="rId16"/>
   </p:sldIdLst>
   <p:sldSz cx="9144000" cy="6858000" type="screen4x3"/>
   <p:notesSz cx="6858000" cy="9144000"/>
@@ -824,6 +834,1700 @@
             <a:fld id="{18BDFEC3-8487-43E8-A154-7C12CBC1FFF2}" type="slidenum">
               <a:rPr lang="en-US"/>
               <a:t>2</a:t>
+            </a:fld>
+            <a:endParaRPr lang="en-US"/>
+          </a:p>
+        </p:txBody>
+      </p:sp>
+    </p:spTree>
+  </p:cSld>
+</p:notes>
+</file>
+
+<file path=ppt/notesSlides/notesSlide2.xml><?xml version="1.0" encoding="utf-8"?>
+<p:notes xmlns:a="http://schemas.openxmlformats.org/drawingml/2006/main" xmlns:r="http://schemas.openxmlformats.org/officeDocument/2006/relationships" xmlns:p="http://schemas.openxmlformats.org/presentationml/2006/main">
+  <p:cSld>
+    <p:spTree>
+      <p:nvGrpSpPr>
+        <p:cNvPr id="1" name=""/>
+        <p:cNvGrpSpPr/>
+        <p:nvPr/>
+      </p:nvGrpSpPr>
+      <p:grpSpPr>
+        <a:xfrm>
+          <a:off x="0" y="0"/>
+          <a:ext cx="0" cy="0"/>
+          <a:chOff x="0" y="0"/>
+          <a:chExt cx="0" cy="0"/>
+        </a:xfrm>
+      </p:grpSpPr>
+      <p:sp>
+        <p:nvSpPr>
+          <p:cNvPr id="2" name="Slide Image Placeholder 1"/>
+          <p:cNvSpPr>
+            <a:spLocks noGrp="1" noRot="1" noChangeAspect="1"/>
+          </p:cNvSpPr>
+          <p:nvPr>
+            <p:ph type="sldImg"/>
+          </p:nvPr>
+        </p:nvSpPr>
+        <p:spPr/>
+      </p:sp>
+      <p:sp>
+        <p:nvSpPr>
+          <p:cNvPr id="3" name="Notes Placeholder 2"/>
+          <p:cNvSpPr>
+            <a:spLocks noGrp="1"/>
+          </p:cNvSpPr>
+          <p:nvPr>
+            <p:ph type="body" idx="1"/>
+          </p:nvPr>
+        </p:nvSpPr>
+        <p:spPr/>
+        <p:txBody>
+          <a:bodyPr/>
+          <a:lstStyle/>
+          <a:p>
+            <a:pPr lvl="0" marL="0" indent="0">
+              <a:buNone/>
+            </a:pPr>
+            <a:r>
+              <a:rPr/>
+              <a:t>We’ll</a:t>
+            </a:r>
+            <a:r>
+              <a:rPr/>
+              <a:t> </a:t>
+            </a:r>
+            <a:r>
+              <a:rPr/>
+              <a:t>describe</a:t>
+            </a:r>
+            <a:r>
+              <a:rPr/>
+              <a:t> </a:t>
+            </a:r>
+            <a:r>
+              <a:rPr/>
+              <a:t>this</a:t>
+            </a:r>
+            <a:r>
+              <a:rPr/>
+              <a:t> </a:t>
+            </a:r>
+            <a:r>
+              <a:rPr/>
+              <a:t>in</a:t>
+            </a:r>
+            <a:r>
+              <a:rPr/>
+              <a:t> </a:t>
+            </a:r>
+            <a:r>
+              <a:rPr/>
+              <a:t>more</a:t>
+            </a:r>
+            <a:r>
+              <a:rPr/>
+              <a:t> </a:t>
+            </a:r>
+            <a:r>
+              <a:rPr/>
+              <a:t>detail,</a:t>
+            </a:r>
+            <a:r>
+              <a:rPr/>
+              <a:t> </a:t>
+            </a:r>
+            <a:r>
+              <a:rPr/>
+              <a:t>but</a:t>
+            </a:r>
+            <a:r>
+              <a:rPr/>
+              <a:t> </a:t>
+            </a:r>
+            <a:r>
+              <a:rPr/>
+              <a:t>here’s</a:t>
+            </a:r>
+            <a:r>
+              <a:rPr/>
+              <a:t> </a:t>
+            </a:r>
+            <a:r>
+              <a:rPr/>
+              <a:t>a</a:t>
+            </a:r>
+            <a:r>
+              <a:rPr/>
+              <a:t> </a:t>
+            </a:r>
+            <a:r>
+              <a:rPr/>
+              <a:t>quick</a:t>
+            </a:r>
+            <a:r>
+              <a:rPr/>
+              <a:t> </a:t>
+            </a:r>
+            <a:r>
+              <a:rPr/>
+              <a:t>overview</a:t>
+            </a:r>
+            <a:r>
+              <a:rPr/>
+              <a:t> </a:t>
+            </a:r>
+            <a:r>
+              <a:rPr/>
+              <a:t>of</a:t>
+            </a:r>
+            <a:r>
+              <a:rPr/>
+              <a:t> </a:t>
+            </a:r>
+            <a:r>
+              <a:rPr/>
+              <a:t>the</a:t>
+            </a:r>
+            <a:r>
+              <a:rPr/>
+              <a:t> </a:t>
+            </a:r>
+            <a:r>
+              <a:rPr/>
+              <a:t>four</a:t>
+            </a:r>
+            <a:r>
+              <a:rPr/>
+              <a:t> </a:t>
+            </a:r>
+            <a:r>
+              <a:rPr/>
+              <a:t>basic</a:t>
+            </a:r>
+            <a:r>
+              <a:rPr/>
+              <a:t> </a:t>
+            </a:r>
+            <a:r>
+              <a:rPr/>
+              <a:t>types</a:t>
+            </a:r>
+            <a:r>
+              <a:rPr/>
+              <a:t> </a:t>
+            </a:r>
+            <a:r>
+              <a:rPr/>
+              <a:t>of</a:t>
+            </a:r>
+            <a:r>
+              <a:rPr/>
+              <a:t> </a:t>
+            </a:r>
+            <a:r>
+              <a:rPr/>
+              <a:t>joins.</a:t>
+            </a:r>
+          </a:p>
+          <a:p>
+            <a:pPr lvl="0" marL="0" indent="0">
+              <a:buNone/>
+            </a:pPr>
+          </a:p>
+          <a:p>
+            <a:pPr lvl="0" marL="0" indent="0">
+              <a:buNone/>
+            </a:pPr>
+            <a:r>
+              <a:rPr/>
+              <a:t>The</a:t>
+            </a:r>
+            <a:r>
+              <a:rPr/>
+              <a:t> </a:t>
+            </a:r>
+            <a:r>
+              <a:rPr/>
+              <a:t>inner</a:t>
+            </a:r>
+            <a:r>
+              <a:rPr/>
+              <a:t> </a:t>
+            </a:r>
+            <a:r>
+              <a:rPr/>
+              <a:t>join</a:t>
+            </a:r>
+            <a:r>
+              <a:rPr/>
+              <a:t> </a:t>
+            </a:r>
+            <a:r>
+              <a:rPr/>
+              <a:t>removes</a:t>
+            </a:r>
+            <a:r>
+              <a:rPr/>
+              <a:t> </a:t>
+            </a:r>
+            <a:r>
+              <a:rPr/>
+              <a:t>any</a:t>
+            </a:r>
+            <a:r>
+              <a:rPr/>
+              <a:t> </a:t>
+            </a:r>
+            <a:r>
+              <a:rPr/>
+              <a:t>mismatches.</a:t>
+            </a:r>
+            <a:r>
+              <a:rPr/>
+              <a:t> </a:t>
+            </a:r>
+            <a:r>
+              <a:rPr/>
+              <a:t>If</a:t>
+            </a:r>
+            <a:r>
+              <a:rPr/>
+              <a:t> </a:t>
+            </a:r>
+            <a:r>
+              <a:rPr/>
+              <a:t>a</a:t>
+            </a:r>
+            <a:r>
+              <a:rPr/>
+              <a:t> </a:t>
+            </a:r>
+            <a:r>
+              <a:rPr/>
+              <a:t>key</a:t>
+            </a:r>
+            <a:r>
+              <a:rPr/>
+              <a:t> </a:t>
+            </a:r>
+            <a:r>
+              <a:rPr/>
+              <a:t>in</a:t>
+            </a:r>
+            <a:r>
+              <a:rPr/>
+              <a:t> </a:t>
+            </a:r>
+            <a:r>
+              <a:rPr/>
+              <a:t>the</a:t>
+            </a:r>
+            <a:r>
+              <a:rPr/>
+              <a:t> </a:t>
+            </a:r>
+            <a:r>
+              <a:rPr/>
+              <a:t>first</a:t>
+            </a:r>
+            <a:r>
+              <a:rPr/>
+              <a:t> </a:t>
+            </a:r>
+            <a:r>
+              <a:rPr/>
+              <a:t>table</a:t>
+            </a:r>
+            <a:r>
+              <a:rPr/>
+              <a:t> </a:t>
+            </a:r>
+            <a:r>
+              <a:rPr/>
+              <a:t>is</a:t>
+            </a:r>
+            <a:r>
+              <a:rPr/>
+              <a:t> </a:t>
+            </a:r>
+            <a:r>
+              <a:rPr/>
+              <a:t>not</a:t>
+            </a:r>
+            <a:r>
+              <a:rPr/>
+              <a:t> </a:t>
+            </a:r>
+            <a:r>
+              <a:rPr/>
+              <a:t>found</a:t>
+            </a:r>
+            <a:r>
+              <a:rPr/>
+              <a:t> </a:t>
+            </a:r>
+            <a:r>
+              <a:rPr/>
+              <a:t>in</a:t>
+            </a:r>
+            <a:r>
+              <a:rPr/>
+              <a:t> </a:t>
+            </a:r>
+            <a:r>
+              <a:rPr/>
+              <a:t>the</a:t>
+            </a:r>
+            <a:r>
+              <a:rPr/>
+              <a:t> </a:t>
+            </a:r>
+            <a:r>
+              <a:rPr/>
+              <a:t>second</a:t>
+            </a:r>
+            <a:r>
+              <a:rPr/>
+              <a:t> </a:t>
+            </a:r>
+            <a:r>
+              <a:rPr/>
+              <a:t>table,</a:t>
+            </a:r>
+            <a:r>
+              <a:rPr/>
+              <a:t> </a:t>
+            </a:r>
+            <a:r>
+              <a:rPr/>
+              <a:t>sorry</a:t>
+            </a:r>
+            <a:r>
+              <a:rPr/>
+              <a:t> </a:t>
+            </a:r>
+            <a:r>
+              <a:rPr/>
+              <a:t>but</a:t>
+            </a:r>
+            <a:r>
+              <a:rPr/>
+              <a:t> </a:t>
+            </a:r>
+            <a:r>
+              <a:rPr/>
+              <a:t>you’re</a:t>
+            </a:r>
+            <a:r>
+              <a:rPr/>
+              <a:t> </a:t>
+            </a:r>
+            <a:r>
+              <a:rPr/>
+              <a:t>gone.</a:t>
+            </a:r>
+            <a:r>
+              <a:rPr/>
+              <a:t> </a:t>
+            </a:r>
+            <a:r>
+              <a:rPr/>
+              <a:t>If</a:t>
+            </a:r>
+            <a:r>
+              <a:rPr/>
+              <a:t> </a:t>
+            </a:r>
+            <a:r>
+              <a:rPr/>
+              <a:t>a</a:t>
+            </a:r>
+            <a:r>
+              <a:rPr/>
+              <a:t> </a:t>
+            </a:r>
+            <a:r>
+              <a:rPr/>
+              <a:t>key</a:t>
+            </a:r>
+            <a:r>
+              <a:rPr/>
+              <a:t> </a:t>
+            </a:r>
+            <a:r>
+              <a:rPr/>
+              <a:t>in</a:t>
+            </a:r>
+            <a:r>
+              <a:rPr/>
+              <a:t> </a:t>
+            </a:r>
+            <a:r>
+              <a:rPr/>
+              <a:t>the</a:t>
+            </a:r>
+            <a:r>
+              <a:rPr/>
+              <a:t> </a:t>
+            </a:r>
+            <a:r>
+              <a:rPr/>
+              <a:t>second</a:t>
+            </a:r>
+            <a:r>
+              <a:rPr/>
+              <a:t> </a:t>
+            </a:r>
+            <a:r>
+              <a:rPr/>
+              <a:t>table</a:t>
+            </a:r>
+            <a:r>
+              <a:rPr/>
+              <a:t> </a:t>
+            </a:r>
+            <a:r>
+              <a:rPr/>
+              <a:t>is</a:t>
+            </a:r>
+            <a:r>
+              <a:rPr/>
+              <a:t> </a:t>
+            </a:r>
+            <a:r>
+              <a:rPr/>
+              <a:t>not</a:t>
+            </a:r>
+            <a:r>
+              <a:rPr/>
+              <a:t> </a:t>
+            </a:r>
+            <a:r>
+              <a:rPr/>
+              <a:t>found</a:t>
+            </a:r>
+            <a:r>
+              <a:rPr/>
+              <a:t> </a:t>
+            </a:r>
+            <a:r>
+              <a:rPr/>
+              <a:t>in</a:t>
+            </a:r>
+            <a:r>
+              <a:rPr/>
+              <a:t> </a:t>
+            </a:r>
+            <a:r>
+              <a:rPr/>
+              <a:t>the</a:t>
+            </a:r>
+            <a:r>
+              <a:rPr/>
+              <a:t> </a:t>
+            </a:r>
+            <a:r>
+              <a:rPr/>
+              <a:t>first</a:t>
+            </a:r>
+            <a:r>
+              <a:rPr/>
+              <a:t> </a:t>
+            </a:r>
+            <a:r>
+              <a:rPr/>
+              <a:t>table,</a:t>
+            </a:r>
+            <a:r>
+              <a:rPr/>
+              <a:t> </a:t>
+            </a:r>
+            <a:r>
+              <a:rPr/>
+              <a:t>sorry</a:t>
+            </a:r>
+            <a:r>
+              <a:rPr/>
+              <a:t> </a:t>
+            </a:r>
+            <a:r>
+              <a:rPr/>
+              <a:t>but</a:t>
+            </a:r>
+            <a:r>
+              <a:rPr/>
+              <a:t> </a:t>
+            </a:r>
+            <a:r>
+              <a:rPr/>
+              <a:t>you’re</a:t>
+            </a:r>
+            <a:r>
+              <a:rPr/>
+              <a:t> </a:t>
+            </a:r>
+            <a:r>
+              <a:rPr/>
+              <a:t>gone</a:t>
+            </a:r>
+            <a:r>
+              <a:rPr/>
+              <a:t> </a:t>
+            </a:r>
+            <a:r>
+              <a:rPr/>
+              <a:t>also.</a:t>
+            </a:r>
+          </a:p>
+          <a:p>
+            <a:pPr lvl="0" marL="0" indent="0">
+              <a:buNone/>
+            </a:pPr>
+          </a:p>
+          <a:p>
+            <a:pPr lvl="0" marL="0" indent="0">
+              <a:buNone/>
+            </a:pPr>
+            <a:r>
+              <a:rPr/>
+              <a:t>Note</a:t>
+            </a:r>
+            <a:r>
+              <a:rPr/>
+              <a:t> </a:t>
+            </a:r>
+            <a:r>
+              <a:rPr/>
+              <a:t>that</a:t>
+            </a:r>
+            <a:r>
+              <a:rPr/>
+              <a:t> </a:t>
+            </a:r>
+            <a:r>
+              <a:rPr/>
+              <a:t>the</a:t>
+            </a:r>
+            <a:r>
+              <a:rPr/>
+              <a:t> </a:t>
+            </a:r>
+            <a:r>
+              <a:rPr/>
+              <a:t>order</a:t>
+            </a:r>
+            <a:r>
+              <a:rPr/>
+              <a:t> </a:t>
+            </a:r>
+            <a:r>
+              <a:rPr/>
+              <a:t>is</a:t>
+            </a:r>
+            <a:r>
+              <a:rPr/>
+              <a:t> </a:t>
+            </a:r>
+            <a:r>
+              <a:rPr/>
+              <a:t>not</a:t>
+            </a:r>
+            <a:r>
+              <a:rPr/>
+              <a:t> </a:t>
+            </a:r>
+            <a:r>
+              <a:rPr/>
+              <a:t>important</a:t>
+            </a:r>
+            <a:r>
+              <a:rPr/>
+              <a:t> </a:t>
+            </a:r>
+            <a:r>
+              <a:rPr/>
+              <a:t>here.</a:t>
+            </a:r>
+            <a:r>
+              <a:rPr/>
+              <a:t> </a:t>
+            </a:r>
+            <a:r>
+              <a:rPr/>
+              <a:t>If</a:t>
+            </a:r>
+            <a:r>
+              <a:rPr/>
+              <a:t> </a:t>
+            </a:r>
+            <a:r>
+              <a:rPr/>
+              <a:t>you</a:t>
+            </a:r>
+            <a:r>
+              <a:rPr/>
+              <a:t> </a:t>
+            </a:r>
+            <a:r>
+              <a:rPr/>
+              <a:t>swapped</a:t>
+            </a:r>
+            <a:r>
+              <a:rPr/>
+              <a:t> </a:t>
+            </a:r>
+            <a:r>
+              <a:rPr/>
+              <a:t>the</a:t>
+            </a:r>
+            <a:r>
+              <a:rPr/>
+              <a:t> </a:t>
+            </a:r>
+            <a:r>
+              <a:rPr/>
+              <a:t>first</a:t>
+            </a:r>
+            <a:r>
+              <a:rPr/>
+              <a:t> </a:t>
+            </a:r>
+            <a:r>
+              <a:rPr/>
+              <a:t>table</a:t>
+            </a:r>
+            <a:r>
+              <a:rPr/>
+              <a:t> </a:t>
+            </a:r>
+            <a:r>
+              <a:rPr/>
+              <a:t>and</a:t>
+            </a:r>
+            <a:r>
+              <a:rPr/>
+              <a:t> </a:t>
+            </a:r>
+            <a:r>
+              <a:rPr/>
+              <a:t>the</a:t>
+            </a:r>
+            <a:r>
+              <a:rPr/>
+              <a:t> </a:t>
+            </a:r>
+            <a:r>
+              <a:rPr/>
+              <a:t>second</a:t>
+            </a:r>
+            <a:r>
+              <a:rPr/>
+              <a:t> </a:t>
+            </a:r>
+            <a:r>
+              <a:rPr/>
+              <a:t>table,</a:t>
+            </a:r>
+            <a:r>
+              <a:rPr/>
+              <a:t> </a:t>
+            </a:r>
+            <a:r>
+              <a:rPr/>
+              <a:t>maybe</a:t>
+            </a:r>
+            <a:r>
+              <a:rPr/>
+              <a:t> </a:t>
+            </a:r>
+            <a:r>
+              <a:rPr/>
+              <a:t>the</a:t>
+            </a:r>
+            <a:r>
+              <a:rPr/>
+              <a:t> </a:t>
+            </a:r>
+            <a:r>
+              <a:rPr/>
+              <a:t>arrangement</a:t>
+            </a:r>
+            <a:r>
+              <a:rPr/>
+              <a:t> </a:t>
+            </a:r>
+            <a:r>
+              <a:rPr/>
+              <a:t>of</a:t>
+            </a:r>
+            <a:r>
+              <a:rPr/>
+              <a:t> </a:t>
+            </a:r>
+            <a:r>
+              <a:rPr/>
+              <a:t>the</a:t>
+            </a:r>
+            <a:r>
+              <a:rPr/>
+              <a:t> </a:t>
+            </a:r>
+            <a:r>
+              <a:rPr/>
+              <a:t>columns</a:t>
+            </a:r>
+            <a:r>
+              <a:rPr/>
+              <a:t> </a:t>
+            </a:r>
+            <a:r>
+              <a:rPr/>
+              <a:t>might</a:t>
+            </a:r>
+            <a:r>
+              <a:rPr/>
+              <a:t> </a:t>
+            </a:r>
+            <a:r>
+              <a:rPr/>
+              <a:t>change,</a:t>
+            </a:r>
+            <a:r>
+              <a:rPr/>
+              <a:t> </a:t>
+            </a:r>
+            <a:r>
+              <a:rPr/>
+              <a:t>and</a:t>
+            </a:r>
+            <a:r>
+              <a:rPr/>
+              <a:t> </a:t>
+            </a:r>
+            <a:r>
+              <a:rPr/>
+              <a:t>maybe</a:t>
+            </a:r>
+            <a:r>
+              <a:rPr/>
+              <a:t> </a:t>
+            </a:r>
+            <a:r>
+              <a:rPr/>
+              <a:t>the</a:t>
+            </a:r>
+            <a:r>
+              <a:rPr/>
+              <a:t> </a:t>
+            </a:r>
+            <a:r>
+              <a:rPr/>
+              <a:t>arrangement</a:t>
+            </a:r>
+            <a:r>
+              <a:rPr/>
+              <a:t> </a:t>
+            </a:r>
+            <a:r>
+              <a:rPr/>
+              <a:t>of</a:t>
+            </a:r>
+            <a:r>
+              <a:rPr/>
+              <a:t> </a:t>
+            </a:r>
+            <a:r>
+              <a:rPr/>
+              <a:t>the</a:t>
+            </a:r>
+            <a:r>
+              <a:rPr/>
+              <a:t> </a:t>
+            </a:r>
+            <a:r>
+              <a:rPr/>
+              <a:t>rows</a:t>
+            </a:r>
+            <a:r>
+              <a:rPr/>
+              <a:t> </a:t>
+            </a:r>
+            <a:r>
+              <a:rPr/>
+              <a:t>might</a:t>
+            </a:r>
+            <a:r>
+              <a:rPr/>
+              <a:t> </a:t>
+            </a:r>
+            <a:r>
+              <a:rPr/>
+              <a:t>change,</a:t>
+            </a:r>
+            <a:r>
+              <a:rPr/>
+              <a:t> </a:t>
+            </a:r>
+            <a:r>
+              <a:rPr/>
+              <a:t>but</a:t>
+            </a:r>
+            <a:r>
+              <a:rPr/>
+              <a:t> </a:t>
+            </a:r>
+            <a:r>
+              <a:rPr/>
+              <a:t>the</a:t>
+            </a:r>
+            <a:r>
+              <a:rPr/>
+              <a:t> </a:t>
+            </a:r>
+            <a:r>
+              <a:rPr/>
+              <a:t>table</a:t>
+            </a:r>
+            <a:r>
+              <a:rPr/>
+              <a:t> </a:t>
+            </a:r>
+            <a:r>
+              <a:rPr/>
+              <a:t>would</a:t>
+            </a:r>
+            <a:r>
+              <a:rPr/>
+              <a:t> </a:t>
+            </a:r>
+            <a:r>
+              <a:rPr/>
+              <a:t>be</a:t>
+            </a:r>
+            <a:r>
+              <a:rPr/>
+              <a:t> </a:t>
+            </a:r>
+            <a:r>
+              <a:rPr/>
+              <a:t>the</a:t>
+            </a:r>
+            <a:r>
+              <a:rPr/>
+              <a:t> </a:t>
+            </a:r>
+            <a:r>
+              <a:rPr/>
+              <a:t>same</a:t>
+            </a:r>
+            <a:r>
+              <a:rPr/>
+              <a:t> </a:t>
+            </a:r>
+            <a:r>
+              <a:rPr/>
+              <a:t>size</a:t>
+            </a:r>
+            <a:r>
+              <a:rPr/>
+              <a:t> </a:t>
+            </a:r>
+            <a:r>
+              <a:rPr/>
+              <a:t>and</a:t>
+            </a:r>
+            <a:r>
+              <a:rPr/>
+              <a:t> </a:t>
+            </a:r>
+            <a:r>
+              <a:rPr/>
+              <a:t>would</a:t>
+            </a:r>
+            <a:r>
+              <a:rPr/>
+              <a:t> </a:t>
+            </a:r>
+            <a:r>
+              <a:rPr/>
+              <a:t>effectively</a:t>
+            </a:r>
+            <a:r>
+              <a:rPr/>
+              <a:t> </a:t>
+            </a:r>
+            <a:r>
+              <a:rPr/>
+              <a:t>contain</a:t>
+            </a:r>
+            <a:r>
+              <a:rPr/>
+              <a:t> </a:t>
+            </a:r>
+            <a:r>
+              <a:rPr/>
+              <a:t>the</a:t>
+            </a:r>
+            <a:r>
+              <a:rPr/>
+              <a:t> </a:t>
+            </a:r>
+            <a:r>
+              <a:rPr/>
+              <a:t>same</a:t>
+            </a:r>
+            <a:r>
+              <a:rPr/>
+              <a:t> </a:t>
+            </a:r>
+            <a:r>
+              <a:rPr/>
+              <a:t>information.</a:t>
+            </a:r>
+          </a:p>
+        </p:txBody>
+      </p:sp>
+      <p:sp>
+        <p:nvSpPr>
+          <p:cNvPr id="4" name="Slide Number Placeholder 3"/>
+          <p:cNvSpPr>
+            <a:spLocks noGrp="1"/>
+          </p:cNvSpPr>
+          <p:nvPr>
+            <p:ph type="sldNum" sz="quarter" idx="10"/>
+          </p:nvPr>
+        </p:nvSpPr>
+        <p:spPr/>
+        <p:txBody>
+          <a:bodyPr/>
+          <a:lstStyle/>
+          <a:p>
+            <a:fld id="{18BDFEC3-8487-43E8-A154-7C12CBC1FFF2}" type="slidenum">
+              <a:rPr lang="en-US"/>
+              <a:t>3</a:t>
+            </a:fld>
+            <a:endParaRPr lang="en-US"/>
+          </a:p>
+        </p:txBody>
+      </p:sp>
+    </p:spTree>
+  </p:cSld>
+</p:notes>
+</file>
+
+<file path=ppt/notesSlides/notesSlide3.xml><?xml version="1.0" encoding="utf-8"?>
+<p:notes xmlns:a="http://schemas.openxmlformats.org/drawingml/2006/main" xmlns:r="http://schemas.openxmlformats.org/officeDocument/2006/relationships" xmlns:p="http://schemas.openxmlformats.org/presentationml/2006/main">
+  <p:cSld>
+    <p:spTree>
+      <p:nvGrpSpPr>
+        <p:cNvPr id="1" name=""/>
+        <p:cNvGrpSpPr/>
+        <p:nvPr/>
+      </p:nvGrpSpPr>
+      <p:grpSpPr>
+        <a:xfrm>
+          <a:off x="0" y="0"/>
+          <a:ext cx="0" cy="0"/>
+          <a:chOff x="0" y="0"/>
+          <a:chExt cx="0" cy="0"/>
+        </a:xfrm>
+      </p:grpSpPr>
+      <p:sp>
+        <p:nvSpPr>
+          <p:cNvPr id="2" name="Slide Image Placeholder 1"/>
+          <p:cNvSpPr>
+            <a:spLocks noGrp="1" noRot="1" noChangeAspect="1"/>
+          </p:cNvSpPr>
+          <p:nvPr>
+            <p:ph type="sldImg"/>
+          </p:nvPr>
+        </p:nvSpPr>
+        <p:spPr/>
+      </p:sp>
+      <p:sp>
+        <p:nvSpPr>
+          <p:cNvPr id="3" name="Notes Placeholder 2"/>
+          <p:cNvSpPr>
+            <a:spLocks noGrp="1"/>
+          </p:cNvSpPr>
+          <p:nvPr>
+            <p:ph type="body" idx="1"/>
+          </p:nvPr>
+        </p:nvSpPr>
+        <p:spPr/>
+        <p:txBody>
+          <a:bodyPr/>
+          <a:lstStyle/>
+          <a:p>
+            <a:pPr lvl="0" marL="0" indent="0">
+              <a:buNone/>
+            </a:pPr>
+            <a:r>
+              <a:rPr/>
+              <a:t>The</a:t>
+            </a:r>
+            <a:r>
+              <a:rPr/>
+              <a:t> </a:t>
+            </a:r>
+            <a:r>
+              <a:rPr/>
+              <a:t>left</a:t>
+            </a:r>
+            <a:r>
+              <a:rPr/>
+              <a:t> </a:t>
+            </a:r>
+            <a:r>
+              <a:rPr/>
+              <a:t>join</a:t>
+            </a:r>
+            <a:r>
+              <a:rPr/>
+              <a:t> </a:t>
+            </a:r>
+            <a:r>
+              <a:rPr/>
+              <a:t>will</a:t>
+            </a:r>
+            <a:r>
+              <a:rPr/>
+              <a:t> </a:t>
+            </a:r>
+            <a:r>
+              <a:rPr/>
+              <a:t>remove</a:t>
+            </a:r>
+            <a:r>
+              <a:rPr/>
+              <a:t> </a:t>
+            </a:r>
+            <a:r>
+              <a:rPr/>
+              <a:t>mismatches</a:t>
+            </a:r>
+            <a:r>
+              <a:rPr/>
+              <a:t> </a:t>
+            </a:r>
+            <a:r>
+              <a:rPr/>
+              <a:t>from</a:t>
+            </a:r>
+            <a:r>
+              <a:rPr/>
+              <a:t> </a:t>
+            </a:r>
+            <a:r>
+              <a:rPr/>
+              <a:t>the</a:t>
+            </a:r>
+            <a:r>
+              <a:rPr/>
+              <a:t> </a:t>
+            </a:r>
+            <a:r>
+              <a:rPr/>
+              <a:t>second</a:t>
+            </a:r>
+            <a:r>
+              <a:rPr/>
+              <a:t> </a:t>
+            </a:r>
+            <a:r>
+              <a:rPr/>
+              <a:t>database.</a:t>
+            </a:r>
+            <a:r>
+              <a:rPr/>
+              <a:t> </a:t>
+            </a:r>
+            <a:r>
+              <a:rPr/>
+              <a:t>If</a:t>
+            </a:r>
+            <a:r>
+              <a:rPr/>
+              <a:t> </a:t>
+            </a:r>
+            <a:r>
+              <a:rPr/>
+              <a:t>a</a:t>
+            </a:r>
+            <a:r>
+              <a:rPr/>
+              <a:t> </a:t>
+            </a:r>
+            <a:r>
+              <a:rPr/>
+              <a:t>key</a:t>
+            </a:r>
+            <a:r>
+              <a:rPr/>
+              <a:t> </a:t>
+            </a:r>
+            <a:r>
+              <a:rPr/>
+              <a:t>in</a:t>
+            </a:r>
+            <a:r>
+              <a:rPr/>
+              <a:t> </a:t>
+            </a:r>
+            <a:r>
+              <a:rPr/>
+              <a:t>the</a:t>
+            </a:r>
+            <a:r>
+              <a:rPr/>
+              <a:t> </a:t>
+            </a:r>
+            <a:r>
+              <a:rPr/>
+              <a:t>second</a:t>
+            </a:r>
+            <a:r>
+              <a:rPr/>
+              <a:t> </a:t>
+            </a:r>
+            <a:r>
+              <a:rPr/>
+              <a:t>database</a:t>
+            </a:r>
+            <a:r>
+              <a:rPr/>
+              <a:t> </a:t>
+            </a:r>
+            <a:r>
+              <a:rPr/>
+              <a:t>is</a:t>
+            </a:r>
+            <a:r>
+              <a:rPr/>
+              <a:t> </a:t>
+            </a:r>
+            <a:r>
+              <a:rPr/>
+              <a:t>not</a:t>
+            </a:r>
+            <a:r>
+              <a:rPr/>
+              <a:t> </a:t>
+            </a:r>
+            <a:r>
+              <a:rPr/>
+              <a:t>found</a:t>
+            </a:r>
+            <a:r>
+              <a:rPr/>
+              <a:t> </a:t>
+            </a:r>
+            <a:r>
+              <a:rPr/>
+              <a:t>in</a:t>
+            </a:r>
+            <a:r>
+              <a:rPr/>
+              <a:t> </a:t>
+            </a:r>
+            <a:r>
+              <a:rPr/>
+              <a:t>the</a:t>
+            </a:r>
+            <a:r>
+              <a:rPr/>
+              <a:t> </a:t>
+            </a:r>
+            <a:r>
+              <a:rPr/>
+              <a:t>first</a:t>
+            </a:r>
+            <a:r>
+              <a:rPr/>
+              <a:t> </a:t>
+            </a:r>
+            <a:r>
+              <a:rPr/>
+              <a:t>database,</a:t>
+            </a:r>
+            <a:r>
+              <a:rPr/>
+              <a:t> </a:t>
+            </a:r>
+            <a:r>
+              <a:rPr/>
+              <a:t>then</a:t>
+            </a:r>
+            <a:r>
+              <a:rPr/>
+              <a:t> </a:t>
+            </a:r>
+            <a:r>
+              <a:rPr/>
+              <a:t>sorry</a:t>
+            </a:r>
+            <a:r>
+              <a:rPr/>
+              <a:t> </a:t>
+            </a:r>
+            <a:r>
+              <a:rPr/>
+              <a:t>by</a:t>
+            </a:r>
+            <a:r>
+              <a:rPr/>
+              <a:t> </a:t>
+            </a:r>
+            <a:r>
+              <a:rPr/>
+              <a:t>you’re</a:t>
+            </a:r>
+            <a:r>
+              <a:rPr/>
+              <a:t> </a:t>
+            </a:r>
+            <a:r>
+              <a:rPr/>
+              <a:t>gone.</a:t>
+            </a:r>
+          </a:p>
+          <a:p>
+            <a:pPr lvl="0" marL="0" indent="0">
+              <a:buNone/>
+            </a:pPr>
+          </a:p>
+          <a:p>
+            <a:pPr lvl="0" marL="0" indent="0">
+              <a:buNone/>
+            </a:pPr>
+            <a:r>
+              <a:rPr/>
+              <a:t>Mismatches</a:t>
+            </a:r>
+            <a:r>
+              <a:rPr/>
+              <a:t> </a:t>
+            </a:r>
+            <a:r>
+              <a:rPr/>
+              <a:t>from</a:t>
+            </a:r>
+            <a:r>
+              <a:rPr/>
+              <a:t> </a:t>
+            </a:r>
+            <a:r>
+              <a:rPr/>
+              <a:t>the</a:t>
+            </a:r>
+            <a:r>
+              <a:rPr/>
+              <a:t> </a:t>
+            </a:r>
+            <a:r>
+              <a:rPr/>
+              <a:t>first</a:t>
+            </a:r>
+            <a:r>
+              <a:rPr/>
+              <a:t> </a:t>
+            </a:r>
+            <a:r>
+              <a:rPr/>
+              <a:t>database</a:t>
+            </a:r>
+            <a:r>
+              <a:rPr/>
+              <a:t> </a:t>
+            </a:r>
+            <a:r>
+              <a:rPr/>
+              <a:t>will</a:t>
+            </a:r>
+            <a:r>
+              <a:rPr/>
+              <a:t> </a:t>
+            </a:r>
+            <a:r>
+              <a:rPr/>
+              <a:t>not</a:t>
+            </a:r>
+            <a:r>
+              <a:rPr/>
+              <a:t> </a:t>
+            </a:r>
+            <a:r>
+              <a:rPr/>
+              <a:t>get</a:t>
+            </a:r>
+            <a:r>
+              <a:rPr/>
+              <a:t> </a:t>
+            </a:r>
+            <a:r>
+              <a:rPr/>
+              <a:t>tossed,</a:t>
+            </a:r>
+            <a:r>
+              <a:rPr/>
+              <a:t> </a:t>
+            </a:r>
+            <a:r>
+              <a:rPr/>
+              <a:t>however.</a:t>
+            </a:r>
+            <a:r>
+              <a:rPr/>
+              <a:t> </a:t>
+            </a:r>
+            <a:r>
+              <a:rPr/>
+              <a:t>If</a:t>
+            </a:r>
+            <a:r>
+              <a:rPr/>
+              <a:t> </a:t>
+            </a:r>
+            <a:r>
+              <a:rPr/>
+              <a:t>a</a:t>
+            </a:r>
+            <a:r>
+              <a:rPr/>
+              <a:t> </a:t>
+            </a:r>
+            <a:r>
+              <a:rPr/>
+              <a:t>key</a:t>
+            </a:r>
+            <a:r>
+              <a:rPr/>
+              <a:t> </a:t>
+            </a:r>
+            <a:r>
+              <a:rPr/>
+              <a:t>in</a:t>
+            </a:r>
+            <a:r>
+              <a:rPr/>
+              <a:t> </a:t>
+            </a:r>
+            <a:r>
+              <a:rPr/>
+              <a:t>the</a:t>
+            </a:r>
+            <a:r>
+              <a:rPr/>
+              <a:t> </a:t>
+            </a:r>
+            <a:r>
+              <a:rPr/>
+              <a:t>first</a:t>
+            </a:r>
+            <a:r>
+              <a:rPr/>
+              <a:t> </a:t>
+            </a:r>
+            <a:r>
+              <a:rPr/>
+              <a:t>database</a:t>
+            </a:r>
+            <a:r>
+              <a:rPr/>
+              <a:t> </a:t>
+            </a:r>
+            <a:r>
+              <a:rPr/>
+              <a:t>is</a:t>
+            </a:r>
+            <a:r>
+              <a:rPr/>
+              <a:t> </a:t>
+            </a:r>
+            <a:r>
+              <a:rPr/>
+              <a:t>not</a:t>
+            </a:r>
+            <a:r>
+              <a:rPr/>
+              <a:t> </a:t>
+            </a:r>
+            <a:r>
+              <a:rPr/>
+              <a:t>found</a:t>
+            </a:r>
+            <a:r>
+              <a:rPr/>
+              <a:t> </a:t>
+            </a:r>
+            <a:r>
+              <a:rPr/>
+              <a:t>in</a:t>
+            </a:r>
+            <a:r>
+              <a:rPr/>
+              <a:t> </a:t>
+            </a:r>
+            <a:r>
+              <a:rPr/>
+              <a:t>the</a:t>
+            </a:r>
+            <a:r>
+              <a:rPr/>
+              <a:t> </a:t>
+            </a:r>
+            <a:r>
+              <a:rPr/>
+              <a:t>second</a:t>
+            </a:r>
+            <a:r>
+              <a:rPr/>
+              <a:t> </a:t>
+            </a:r>
+            <a:r>
+              <a:rPr/>
+              <a:t>database,</a:t>
+            </a:r>
+            <a:r>
+              <a:rPr/>
+              <a:t> </a:t>
+            </a:r>
+            <a:r>
+              <a:rPr/>
+              <a:t>that’s</a:t>
+            </a:r>
+            <a:r>
+              <a:rPr/>
+              <a:t> </a:t>
+            </a:r>
+            <a:r>
+              <a:rPr/>
+              <a:t>okay.</a:t>
+            </a:r>
+            <a:r>
+              <a:rPr/>
+              <a:t> </a:t>
+            </a:r>
+            <a:r>
+              <a:rPr/>
+              <a:t>Keep</a:t>
+            </a:r>
+            <a:r>
+              <a:rPr/>
+              <a:t> </a:t>
+            </a:r>
+            <a:r>
+              <a:rPr/>
+              <a:t>the</a:t>
+            </a:r>
+            <a:r>
+              <a:rPr/>
+              <a:t> </a:t>
+            </a:r>
+            <a:r>
+              <a:rPr/>
+              <a:t>record</a:t>
+            </a:r>
+            <a:r>
+              <a:rPr/>
+              <a:t> </a:t>
+            </a:r>
+            <a:r>
+              <a:rPr/>
+              <a:t>in</a:t>
+            </a:r>
+            <a:r>
+              <a:rPr/>
+              <a:t> </a:t>
+            </a:r>
+            <a:r>
+              <a:rPr/>
+              <a:t>the</a:t>
+            </a:r>
+            <a:r>
+              <a:rPr/>
+              <a:t> </a:t>
+            </a:r>
+            <a:r>
+              <a:rPr/>
+              <a:t>database.</a:t>
+            </a:r>
+            <a:r>
+              <a:rPr/>
+              <a:t> </a:t>
+            </a:r>
+            <a:r>
+              <a:rPr/>
+              <a:t>The</a:t>
+            </a:r>
+            <a:r>
+              <a:rPr/>
+              <a:t> </a:t>
+            </a:r>
+            <a:r>
+              <a:rPr/>
+              <a:t>fields</a:t>
+            </a:r>
+            <a:r>
+              <a:rPr/>
+              <a:t> </a:t>
+            </a:r>
+            <a:r>
+              <a:rPr/>
+              <a:t>that</a:t>
+            </a:r>
+            <a:r>
+              <a:rPr/>
+              <a:t> </a:t>
+            </a:r>
+            <a:r>
+              <a:rPr/>
+              <a:t>you</a:t>
+            </a:r>
+            <a:r>
+              <a:rPr/>
+              <a:t> </a:t>
+            </a:r>
+            <a:r>
+              <a:rPr/>
+              <a:t>couldn’t</a:t>
+            </a:r>
+            <a:r>
+              <a:rPr/>
+              <a:t> </a:t>
+            </a:r>
+            <a:r>
+              <a:rPr/>
+              <a:t>find</a:t>
+            </a:r>
+            <a:r>
+              <a:rPr/>
+              <a:t> </a:t>
+            </a:r>
+            <a:r>
+              <a:rPr/>
+              <a:t>in</a:t>
+            </a:r>
+            <a:r>
+              <a:rPr/>
+              <a:t> </a:t>
+            </a:r>
+            <a:r>
+              <a:rPr/>
+              <a:t>the</a:t>
+            </a:r>
+            <a:r>
+              <a:rPr/>
+              <a:t> </a:t>
+            </a:r>
+            <a:r>
+              <a:rPr/>
+              <a:t>second</a:t>
+            </a:r>
+            <a:r>
+              <a:rPr/>
+              <a:t> </a:t>
+            </a:r>
+            <a:r>
+              <a:rPr/>
+              <a:t>database</a:t>
+            </a:r>
+            <a:r>
+              <a:rPr/>
+              <a:t> </a:t>
+            </a:r>
+            <a:r>
+              <a:rPr/>
+              <a:t>because</a:t>
+            </a:r>
+            <a:r>
+              <a:rPr/>
+              <a:t> </a:t>
+            </a:r>
+            <a:r>
+              <a:rPr/>
+              <a:t>of</a:t>
+            </a:r>
+            <a:r>
+              <a:rPr/>
+              <a:t> </a:t>
+            </a:r>
+            <a:r>
+              <a:rPr/>
+              <a:t>the</a:t>
+            </a:r>
+            <a:r>
+              <a:rPr/>
+              <a:t> </a:t>
+            </a:r>
+            <a:r>
+              <a:rPr/>
+              <a:t>mismatch?</a:t>
+            </a:r>
+            <a:r>
+              <a:rPr/>
+              <a:t> </a:t>
+            </a:r>
+            <a:r>
+              <a:rPr/>
+              <a:t>Let’s</a:t>
+            </a:r>
+            <a:r>
+              <a:rPr/>
+              <a:t> </a:t>
+            </a:r>
+            <a:r>
+              <a:rPr/>
+              <a:t>set</a:t>
+            </a:r>
+            <a:r>
+              <a:rPr/>
+              <a:t> </a:t>
+            </a:r>
+            <a:r>
+              <a:rPr/>
+              <a:t>them</a:t>
+            </a:r>
+            <a:r>
+              <a:rPr/>
+              <a:t> </a:t>
+            </a:r>
+            <a:r>
+              <a:rPr/>
+              <a:t>to</a:t>
+            </a:r>
+            <a:r>
+              <a:rPr/>
+              <a:t> </a:t>
+            </a:r>
+            <a:r>
+              <a:rPr/>
+              <a:t>null.</a:t>
+            </a:r>
+          </a:p>
+        </p:txBody>
+      </p:sp>
+      <p:sp>
+        <p:nvSpPr>
+          <p:cNvPr id="4" name="Slide Number Placeholder 3"/>
+          <p:cNvSpPr>
+            <a:spLocks noGrp="1"/>
+          </p:cNvSpPr>
+          <p:nvPr>
+            <p:ph type="sldNum" sz="quarter" idx="10"/>
+          </p:nvPr>
+        </p:nvSpPr>
+        <p:spPr/>
+        <p:txBody>
+          <a:bodyPr/>
+          <a:lstStyle/>
+          <a:p>
+            <a:fld id="{18BDFEC3-8487-43E8-A154-7C12CBC1FFF2}" type="slidenum">
+              <a:rPr lang="en-US"/>
+              <a:t>5</a:t>
             </a:fld>
             <a:endParaRPr lang="en-US"/>
           </a:p>
@@ -3928,23 +5632,681 @@
             </a:pPr>
             <a:r>
               <a:rPr/>
-              <a:t>October</a:t>
-            </a:r>
-            <a:r>
-              <a:rPr/>
-              <a:t> </a:t>
-            </a:r>
-            <a:r>
-              <a:rPr/>
-              <a:t>16,</a:t>
-            </a:r>
-            <a:r>
-              <a:rPr/>
-              <a:t> </a:t>
-            </a:r>
-            <a:r>
-              <a:rPr/>
-              <a:t>2019</a:t>
+              <a:t>Creation</a:t>
+            </a:r>
+            <a:r>
+              <a:rPr/>
+              <a:t> </a:t>
+            </a:r>
+            <a:r>
+              <a:rPr/>
+              <a:t>date:</a:t>
+            </a:r>
+            <a:r>
+              <a:rPr/>
+              <a:t> </a:t>
+            </a:r>
+            <a:r>
+              <a:rPr/>
+              <a:t>2019-10-16</a:t>
+            </a:r>
+          </a:p>
+        </p:txBody>
+      </p:sp>
+    </p:spTree>
+  </p:cSld>
+</p:sld>
+</file>
+
+<file path=ppt/slides/slide10.xml><?xml version="1.0" encoding="utf-8"?>
+<p:sld xmlns:a="http://schemas.openxmlformats.org/drawingml/2006/main" xmlns:r="http://schemas.openxmlformats.org/officeDocument/2006/relationships" xmlns:p="http://schemas.openxmlformats.org/presentationml/2006/main">
+  <p:cSld>
+    <p:spTree>
+      <p:nvGrpSpPr>
+        <p:cNvPr id="1" name=""/>
+        <p:cNvGrpSpPr/>
+        <p:nvPr/>
+      </p:nvGrpSpPr>
+      <p:grpSpPr>
+        <a:xfrm>
+          <a:off x="0" y="0"/>
+          <a:ext cx="0" cy="0"/>
+          <a:chOff x="0" y="0"/>
+          <a:chExt cx="0" cy="0"/>
+        </a:xfrm>
+      </p:grpSpPr>
+      <p:sp>
+        <p:nvSpPr>
+          <p:cNvPr id="2" name="Title 1"/>
+          <p:cNvSpPr>
+            <a:spLocks noGrp="1"/>
+          </p:cNvSpPr>
+          <p:nvPr>
+            <p:ph type="title"/>
+          </p:nvPr>
+        </p:nvSpPr>
+        <p:spPr/>
+        <p:txBody>
+          <a:bodyPr/>
+          <a:lstStyle/>
+          <a:p>
+            <a:pPr lvl="0" marL="0" indent="0">
+              <a:buNone/>
+            </a:pPr>
+            <a:r>
+              <a:rPr/>
+              <a:t>unmatched_labels_db,</a:t>
+            </a:r>
+            <a:r>
+              <a:rPr/>
+              <a:t> </a:t>
+            </a:r>
+            <a:r>
+              <a:rPr/>
+              <a:t>include</a:t>
+            </a:r>
+            <a:r>
+              <a:rPr/>
+              <a:t> </a:t>
+            </a:r>
+            <a:r>
+              <a:rPr/>
+              <a:t>mismatch</a:t>
+            </a:r>
+          </a:p>
+        </p:txBody>
+      </p:sp>
+      <p:sp>
+        <p:nvSpPr>
+          <p:cNvPr id="3" name="Content Placeholder 2"/>
+          <p:cNvSpPr>
+            <a:spLocks noGrp="1"/>
+          </p:cNvSpPr>
+          <p:nvPr>
+            <p:ph idx="1"/>
+          </p:nvPr>
+        </p:nvSpPr>
+        <p:spPr/>
+        <p:txBody>
+          <a:bodyPr/>
+          <a:lstStyle/>
+          <a:p>
+            <a:pPr lvl="0" marL="1270000" indent="0">
+              <a:buNone/>
+            </a:pPr>
+            <a:r>
+              <a:rPr sz="1800">
+                <a:latin typeface="Courier"/>
+              </a:rPr>
+              <a:t>##    id sex sex_code      sex_label
+## 1  NA  NA        9 Did not answer
+## 2 101   1        1         Female
+## 3 102   0        0           Male
+## 4 103   0        0           Male
+## 5 104   1        1         Female
+## 6 105   1        1         Female</a:t>
+            </a:r>
+          </a:p>
+        </p:txBody>
+      </p:sp>
+    </p:spTree>
+  </p:cSld>
+</p:sld>
+</file>
+
+<file path=ppt/slides/slide11.xml><?xml version="1.0" encoding="utf-8"?>
+<p:sld xmlns:a="http://schemas.openxmlformats.org/drawingml/2006/main" xmlns:r="http://schemas.openxmlformats.org/officeDocument/2006/relationships" xmlns:p="http://schemas.openxmlformats.org/presentationml/2006/main">
+  <p:cSld>
+    <p:spTree>
+      <p:nvGrpSpPr>
+        <p:cNvPr id="1" name=""/>
+        <p:cNvGrpSpPr/>
+        <p:nvPr/>
+      </p:nvGrpSpPr>
+      <p:grpSpPr>
+        <a:xfrm>
+          <a:off x="0" y="0"/>
+          <a:ext cx="0" cy="0"/>
+          <a:chOff x="0" y="0"/>
+          <a:chExt cx="0" cy="0"/>
+        </a:xfrm>
+      </p:grpSpPr>
+      <p:sp>
+        <p:nvSpPr>
+          <p:cNvPr id="2" name="Title 1"/>
+          <p:cNvSpPr>
+            <a:spLocks noGrp="1"/>
+          </p:cNvSpPr>
+          <p:nvPr>
+            <p:ph type="title"/>
+          </p:nvPr>
+        </p:nvSpPr>
+        <p:spPr/>
+        <p:txBody>
+          <a:bodyPr/>
+          <a:lstStyle/>
+          <a:p>
+            <a:pPr lvl="0" marL="0" indent="0">
+              <a:buNone/>
+            </a:pPr>
+            <a:r>
+              <a:rPr/>
+              <a:t>unmatched_codes_db,</a:t>
+            </a:r>
+            <a:r>
+              <a:rPr/>
+              <a:t> </a:t>
+            </a:r>
+            <a:r>
+              <a:rPr/>
+              <a:t>listing</a:t>
+            </a:r>
+            <a:r>
+              <a:rPr/>
+              <a:t> </a:t>
+            </a:r>
+            <a:r>
+              <a:rPr/>
+              <a:t>of</a:t>
+            </a:r>
+            <a:r>
+              <a:rPr/>
+              <a:t> </a:t>
+            </a:r>
+            <a:r>
+              <a:rPr/>
+              <a:t>both</a:t>
+            </a:r>
+            <a:r>
+              <a:rPr/>
+              <a:t> </a:t>
+            </a:r>
+            <a:r>
+              <a:rPr/>
+              <a:t>tables</a:t>
+            </a:r>
+          </a:p>
+        </p:txBody>
+      </p:sp>
+      <p:sp>
+        <p:nvSpPr>
+          <p:cNvPr id="3" name="Content Placeholder 2"/>
+          <p:cNvSpPr>
+            <a:spLocks noGrp="1"/>
+          </p:cNvSpPr>
+          <p:nvPr>
+            <p:ph idx="1"/>
+          </p:nvPr>
+        </p:nvSpPr>
+        <p:spPr/>
+        <p:txBody>
+          <a:bodyPr/>
+          <a:lstStyle/>
+          <a:p>
+            <a:pPr lvl="1"/>
+            <a:r>
+              <a:rPr/>
+              <a:t>Listing of results_table</a:t>
+            </a:r>
+          </a:p>
+          <a:p>
+            <a:pPr lvl="0" marL="1270000" indent="0">
+              <a:buNone/>
+            </a:pPr>
+            <a:r>
+              <a:rPr sz="1800">
+                <a:latin typeface="Courier"/>
+              </a:rPr>
+              <a:t>##    id sex
+## 1 101   1
+## 2 102   0
+## 3 103   0
+## 4 104   9
+## 5 105   1</a:t>
+            </a:r>
+          </a:p>
+          <a:p>
+            <a:pPr lvl="1"/>
+            <a:r>
+              <a:rPr/>
+              <a:t>Listing of sex_table</a:t>
+            </a:r>
+          </a:p>
+          <a:p>
+            <a:pPr lvl="0" marL="1270000" indent="0">
+              <a:buNone/>
+            </a:pPr>
+            <a:r>
+              <a:rPr sz="1800">
+                <a:latin typeface="Courier"/>
+              </a:rPr>
+              <a:t>##   sex_code sex_label
+## 1        0      Male
+## 2        1    Female</a:t>
+            </a:r>
+          </a:p>
+        </p:txBody>
+      </p:sp>
+    </p:spTree>
+  </p:cSld>
+</p:sld>
+</file>
+
+<file path=ppt/slides/slide12.xml><?xml version="1.0" encoding="utf-8"?>
+<p:sld xmlns:a="http://schemas.openxmlformats.org/drawingml/2006/main" xmlns:r="http://schemas.openxmlformats.org/officeDocument/2006/relationships" xmlns:p="http://schemas.openxmlformats.org/presentationml/2006/main">
+  <p:cSld>
+    <p:spTree>
+      <p:nvGrpSpPr>
+        <p:cNvPr id="1" name=""/>
+        <p:cNvGrpSpPr/>
+        <p:nvPr/>
+      </p:nvGrpSpPr>
+      <p:grpSpPr>
+        <a:xfrm>
+          <a:off x="0" y="0"/>
+          <a:ext cx="0" cy="0"/>
+          <a:chOff x="0" y="0"/>
+          <a:chExt cx="0" cy="0"/>
+        </a:xfrm>
+      </p:grpSpPr>
+      <p:sp>
+        <p:nvSpPr>
+          <p:cNvPr id="2" name="Title 1"/>
+          <p:cNvSpPr>
+            <a:spLocks noGrp="1"/>
+          </p:cNvSpPr>
+          <p:nvPr>
+            <p:ph type="title"/>
+          </p:nvPr>
+        </p:nvSpPr>
+        <p:spPr/>
+        <p:txBody>
+          <a:bodyPr/>
+          <a:lstStyle/>
+          <a:p>
+            <a:pPr lvl="0" marL="0" indent="0">
+              <a:buNone/>
+            </a:pPr>
+            <a:r>
+              <a:rPr/>
+              <a:t>unmatched_codes_db,</a:t>
+            </a:r>
+            <a:r>
+              <a:rPr/>
+              <a:t> </a:t>
+            </a:r>
+            <a:r>
+              <a:rPr/>
+              <a:t>exclude</a:t>
+            </a:r>
+            <a:r>
+              <a:rPr/>
+              <a:t> </a:t>
+            </a:r>
+            <a:r>
+              <a:rPr/>
+              <a:t>mismatch</a:t>
+            </a:r>
+          </a:p>
+        </p:txBody>
+      </p:sp>
+      <p:sp>
+        <p:nvSpPr>
+          <p:cNvPr id="3" name="Content Placeholder 2"/>
+          <p:cNvSpPr>
+            <a:spLocks noGrp="1"/>
+          </p:cNvSpPr>
+          <p:nvPr>
+            <p:ph idx="1"/>
+          </p:nvPr>
+        </p:nvSpPr>
+        <p:spPr/>
+        <p:txBody>
+          <a:bodyPr/>
+          <a:lstStyle/>
+          <a:p>
+            <a:pPr lvl="0" marL="1270000" indent="0">
+              <a:buNone/>
+            </a:pPr>
+            <a:r>
+              <a:rPr sz="1800">
+                <a:latin typeface="Courier"/>
+              </a:rPr>
+              <a:t>##    id sex sex_code sex_label
+## 1 101   1        1    Female
+## 2 102   0        0      Male
+## 3 103   0        0      Male
+## 4 105   1        1    Female</a:t>
+            </a:r>
+          </a:p>
+        </p:txBody>
+      </p:sp>
+    </p:spTree>
+  </p:cSld>
+</p:sld>
+</file>
+
+<file path=ppt/slides/slide13.xml><?xml version="1.0" encoding="utf-8"?>
+<p:sld xmlns:a="http://schemas.openxmlformats.org/drawingml/2006/main" xmlns:r="http://schemas.openxmlformats.org/officeDocument/2006/relationships" xmlns:p="http://schemas.openxmlformats.org/presentationml/2006/main">
+  <p:cSld>
+    <p:spTree>
+      <p:nvGrpSpPr>
+        <p:cNvPr id="1" name=""/>
+        <p:cNvGrpSpPr/>
+        <p:nvPr/>
+      </p:nvGrpSpPr>
+      <p:grpSpPr>
+        <a:xfrm>
+          <a:off x="0" y="0"/>
+          <a:ext cx="0" cy="0"/>
+          <a:chOff x="0" y="0"/>
+          <a:chExt cx="0" cy="0"/>
+        </a:xfrm>
+      </p:grpSpPr>
+      <p:sp>
+        <p:nvSpPr>
+          <p:cNvPr id="2" name="Title 1"/>
+          <p:cNvSpPr>
+            <a:spLocks noGrp="1"/>
+          </p:cNvSpPr>
+          <p:nvPr>
+            <p:ph type="title"/>
+          </p:nvPr>
+        </p:nvSpPr>
+        <p:spPr/>
+        <p:txBody>
+          <a:bodyPr/>
+          <a:lstStyle/>
+          <a:p>
+            <a:pPr lvl="0" marL="0" indent="0">
+              <a:buNone/>
+            </a:pPr>
+            <a:r>
+              <a:rPr/>
+              <a:t>unmatched_codes_db,</a:t>
+            </a:r>
+            <a:r>
+              <a:rPr/>
+              <a:t> </a:t>
+            </a:r>
+            <a:r>
+              <a:rPr/>
+              <a:t>include</a:t>
+            </a:r>
+            <a:r>
+              <a:rPr/>
+              <a:t> </a:t>
+            </a:r>
+            <a:r>
+              <a:rPr/>
+              <a:t>mismatch</a:t>
+            </a:r>
+          </a:p>
+        </p:txBody>
+      </p:sp>
+      <p:sp>
+        <p:nvSpPr>
+          <p:cNvPr id="3" name="Content Placeholder 2"/>
+          <p:cNvSpPr>
+            <a:spLocks noGrp="1"/>
+          </p:cNvSpPr>
+          <p:nvPr>
+            <p:ph idx="1"/>
+          </p:nvPr>
+        </p:nvSpPr>
+        <p:spPr/>
+        <p:txBody>
+          <a:bodyPr/>
+          <a:lstStyle/>
+          <a:p>
+            <a:pPr lvl="0" marL="1270000" indent="0">
+              <a:buNone/>
+            </a:pPr>
+            <a:r>
+              <a:rPr sz="1800">
+                <a:latin typeface="Courier"/>
+              </a:rPr>
+              <a:t>##    id sex sex_code sex_label
+## 1 101   1        1    Female
+## 2 102   0        0      Male
+## 3 103   0        0      Male
+## 4 104   9       NA      &lt;NA&gt;
+## 5 105   1        1    Female</a:t>
+            </a:r>
+          </a:p>
+        </p:txBody>
+      </p:sp>
+    </p:spTree>
+  </p:cSld>
+</p:sld>
+</file>
+
+<file path=ppt/slides/slide14.xml><?xml version="1.0" encoding="utf-8"?>
+<p:sld xmlns:a="http://schemas.openxmlformats.org/drawingml/2006/main" xmlns:r="http://schemas.openxmlformats.org/officeDocument/2006/relationships" xmlns:p="http://schemas.openxmlformats.org/presentationml/2006/main">
+  <p:cSld>
+    <p:spTree>
+      <p:nvGrpSpPr>
+        <p:cNvPr id="1" name=""/>
+        <p:cNvGrpSpPr/>
+        <p:nvPr/>
+      </p:nvGrpSpPr>
+      <p:grpSpPr>
+        <a:xfrm>
+          <a:off x="0" y="0"/>
+          <a:ext cx="0" cy="0"/>
+          <a:chOff x="0" y="0"/>
+          <a:chExt cx="0" cy="0"/>
+        </a:xfrm>
+      </p:grpSpPr>
+      <p:sp>
+        <p:nvSpPr>
+          <p:cNvPr id="2" name="Title 1"/>
+          <p:cNvSpPr>
+            <a:spLocks noGrp="1"/>
+          </p:cNvSpPr>
+          <p:nvPr>
+            <p:ph type="title"/>
+          </p:nvPr>
+        </p:nvSpPr>
+        <p:spPr/>
+        <p:txBody>
+          <a:bodyPr/>
+          <a:lstStyle/>
+          <a:p>
+            <a:pPr lvl="0" marL="0" indent="0">
+              <a:buNone/>
+            </a:pPr>
+            <a:r>
+              <a:rPr/>
+              <a:t>Practical</a:t>
+            </a:r>
+            <a:r>
+              <a:rPr/>
+              <a:t> </a:t>
+            </a:r>
+            <a:r>
+              <a:rPr/>
+              <a:t>recommendations</a:t>
+            </a:r>
+            <a:r>
+              <a:rPr/>
+              <a:t> </a:t>
+            </a:r>
+            <a:r>
+              <a:rPr/>
+              <a:t>(1/2)</a:t>
+            </a:r>
+          </a:p>
+        </p:txBody>
+      </p:sp>
+      <p:sp>
+        <p:nvSpPr>
+          <p:cNvPr id="3" name="Content Placeholder 2"/>
+          <p:cNvSpPr>
+            <a:spLocks noGrp="1"/>
+          </p:cNvSpPr>
+          <p:nvPr>
+            <p:ph idx="1"/>
+          </p:nvPr>
+        </p:nvSpPr>
+        <p:spPr/>
+        <p:txBody>
+          <a:bodyPr/>
+          <a:lstStyle/>
+          <a:p>
+            <a:pPr lvl="1"/>
+            <a:r>
+              <a:rPr/>
+              <a:t>Unmatched labels</a:t>
+            </a:r>
+          </a:p>
+          <a:p>
+            <a:pPr lvl="2"/>
+            <a:r>
+              <a:rPr/>
+              <a:t>Fairly common occurence</a:t>
+            </a:r>
+          </a:p>
+          <a:p>
+            <a:pPr lvl="2"/>
+            <a:r>
+              <a:rPr/>
+              <a:t>Usually best to exclude mismatches</a:t>
+            </a:r>
+          </a:p>
+          <a:p>
+            <a:pPr lvl="1"/>
+            <a:r>
+              <a:rPr/>
+              <a:t>Unmatched codes</a:t>
+            </a:r>
+          </a:p>
+          <a:p>
+            <a:pPr lvl="2"/>
+            <a:r>
+              <a:rPr/>
+              <a:t>Violation of database integrity</a:t>
+            </a:r>
+          </a:p>
+          <a:p>
+            <a:pPr lvl="2"/>
+            <a:r>
+              <a:rPr/>
+              <a:t>Usually best to include mismatches</a:t>
+            </a:r>
+          </a:p>
+          <a:p>
+            <a:pPr lvl="3"/>
+            <a:r>
+              <a:rPr/>
+              <a:t>Convert null label to number code</a:t>
+            </a:r>
+          </a:p>
+          <a:p>
+            <a:pPr lvl="3"/>
+            <a:r>
+              <a:rPr/>
+              <a:t>Convert null label to “Unlabeled”</a:t>
+            </a:r>
+          </a:p>
+          <a:p>
+            <a:pPr lvl="1"/>
+            <a:r>
+              <a:rPr/>
+              <a:t>Left join results_table to sex_table</a:t>
+            </a:r>
+          </a:p>
+        </p:txBody>
+      </p:sp>
+    </p:spTree>
+  </p:cSld>
+</p:sld>
+</file>
+
+<file path=ppt/slides/slide15.xml><?xml version="1.0" encoding="utf-8"?>
+<p:sld xmlns:a="http://schemas.openxmlformats.org/drawingml/2006/main" xmlns:r="http://schemas.openxmlformats.org/officeDocument/2006/relationships" xmlns:p="http://schemas.openxmlformats.org/presentationml/2006/main">
+  <p:cSld>
+    <p:spTree>
+      <p:nvGrpSpPr>
+        <p:cNvPr id="1" name=""/>
+        <p:cNvGrpSpPr/>
+        <p:nvPr/>
+      </p:nvGrpSpPr>
+      <p:grpSpPr>
+        <a:xfrm>
+          <a:off x="0" y="0"/>
+          <a:ext cx="0" cy="0"/>
+          <a:chOff x="0" y="0"/>
+          <a:chExt cx="0" cy="0"/>
+        </a:xfrm>
+      </p:grpSpPr>
+      <p:sp>
+        <p:nvSpPr>
+          <p:cNvPr id="2" name="Title 1"/>
+          <p:cNvSpPr>
+            <a:spLocks noGrp="1"/>
+          </p:cNvSpPr>
+          <p:nvPr>
+            <p:ph type="title"/>
+          </p:nvPr>
+        </p:nvSpPr>
+        <p:spPr/>
+        <p:txBody>
+          <a:bodyPr/>
+          <a:lstStyle/>
+          <a:p>
+            <a:pPr lvl="0" marL="0" indent="0">
+              <a:buNone/>
+            </a:pPr>
+            <a:r>
+              <a:rPr/>
+              <a:t>Practical</a:t>
+            </a:r>
+            <a:r>
+              <a:rPr/>
+              <a:t> </a:t>
+            </a:r>
+            <a:r>
+              <a:rPr/>
+              <a:t>recommendations</a:t>
+            </a:r>
+            <a:r>
+              <a:rPr/>
+              <a:t> </a:t>
+            </a:r>
+            <a:r>
+              <a:rPr/>
+              <a:t>(2/2)</a:t>
+            </a:r>
+          </a:p>
+        </p:txBody>
+      </p:sp>
+      <p:sp>
+        <p:nvSpPr>
+          <p:cNvPr id="3" name="Content Placeholder 2"/>
+          <p:cNvSpPr>
+            <a:spLocks noGrp="1"/>
+          </p:cNvSpPr>
+          <p:nvPr>
+            <p:ph idx="1"/>
+          </p:nvPr>
+        </p:nvSpPr>
+        <p:spPr/>
+        <p:txBody>
+          <a:bodyPr/>
+          <a:lstStyle/>
+          <a:p>
+            <a:pPr lvl="1"/>
+            <a:r>
+              <a:rPr/>
+              <a:t>Left join results_table to sex_table</a:t>
+            </a:r>
+          </a:p>
+          <a:p>
+            <a:pPr lvl="2"/>
+            <a:r>
+              <a:rPr/>
+              <a:t>Keeps size of results_table unchanged</a:t>
             </a:r>
           </a:p>
         </p:txBody>
@@ -4100,6 +6462,14 @@
             </a:r>
             <a:r>
               <a:rPr/>
+              <a:t>basic</a:t>
+            </a:r>
+            <a:r>
+              <a:rPr/>
+              <a:t> </a:t>
+            </a:r>
+            <a:r>
+              <a:rPr/>
               <a:t>types</a:t>
             </a:r>
             <a:r>
@@ -4118,6 +6488,14 @@
               <a:rPr/>
               <a:t>joins</a:t>
             </a:r>
+            <a:r>
+              <a:rPr/>
+              <a:t> </a:t>
+            </a:r>
+            <a:r>
+              <a:rPr/>
+              <a:t>(1/4)</a:t>
+            </a:r>
           </a:p>
         </p:txBody>
       </p:sp>
@@ -4157,94 +6535,32 @@
             </a:r>
           </a:p>
           <a:p>
+            <a:pPr lvl="2"/>
+            <a:r>
+              <a:rPr/>
+              <a:t>Join order is not too important</a:t>
+            </a:r>
+            <a:br/>
+          </a:p>
+          <a:p>
             <a:pPr lvl="1"/>
             <a:r>
               <a:rPr/>
-              <a:t>Left join</a:t>
-            </a:r>
-          </a:p>
-          <a:p>
-            <a:pPr lvl="2"/>
-            <a:r>
-              <a:rPr/>
-              <a:t>Removes mismatches from second database</a:t>
-            </a:r>
-          </a:p>
-          <a:p>
-            <a:pPr lvl="2"/>
-            <a:r>
-              <a:rPr/>
-              <a:t>Keeps mismatches from first database</a:t>
-            </a:r>
-          </a:p>
-          <a:p>
-            <a:pPr lvl="3"/>
-            <a:r>
-              <a:rPr/>
-              <a:t>Second database fields filled with null values</a:t>
-            </a:r>
-          </a:p>
-          <a:p>
-            <a:pPr lvl="1"/>
-            <a:r>
-              <a:rPr/>
-              <a:t>Right join</a:t>
-            </a:r>
-          </a:p>
-          <a:p>
-            <a:pPr lvl="2"/>
-            <a:r>
-              <a:rPr/>
-              <a:t>Removes mismatches from the first database</a:t>
-            </a:r>
-          </a:p>
-          <a:p>
-            <a:pPr lvl="2"/>
-            <a:r>
-              <a:rPr/>
-              <a:t>Keeps mismatches from the second database</a:t>
-            </a:r>
-          </a:p>
-          <a:p>
-            <a:pPr lvl="3"/>
-            <a:r>
-              <a:rPr/>
-              <a:t>First database fields filled with null values</a:t>
-            </a:r>
-          </a:p>
-          <a:p>
-            <a:pPr lvl="1"/>
-            <a:r>
-              <a:rPr/>
-              <a:t>Full join, outerjoin</a:t>
-            </a:r>
-          </a:p>
-          <a:p>
-            <a:pPr lvl="2"/>
-            <a:r>
-              <a:rPr/>
-              <a:t>Keeps mismatches from first database</a:t>
-            </a:r>
-          </a:p>
-          <a:p>
-            <a:pPr lvl="3"/>
-            <a:r>
-              <a:rPr/>
-              <a:t>Second database fields filled with null values</a:t>
-            </a:r>
-          </a:p>
-          <a:p>
-            <a:pPr lvl="2"/>
-            <a:r>
-              <a:rPr/>
-              <a:t>Keeps mismatches from the second database</a:t>
-            </a:r>
-          </a:p>
-          <a:p>
-            <a:pPr lvl="3"/>
-            <a:r>
-              <a:rPr/>
-              <a:t>First database fields filled with null values</a:t>
+              <a:t>SQL code</a:t>
+            </a:r>
+          </a:p>
+          <a:p>
+            <a:pPr lvl="0" marL="1270000" indent="0">
+              <a:buNone/>
+            </a:pPr>
+            <a:r>
+              <a:rPr sz="1800">
+                <a:latin typeface="Courier"/>
+              </a:rPr>
+              <a:t>select * 
+  from first_table as a
+  inner join second_table as b
+  on a.first_key=b.second_key</a:t>
             </a:r>
           </a:p>
         </p:txBody>
@@ -4291,15 +6607,15 @@
             </a:pPr>
             <a:r>
               <a:rPr/>
-              <a:t>Sample</a:t>
-            </a:r>
-            <a:r>
-              <a:rPr/>
-              <a:t> </a:t>
-            </a:r>
-            <a:r>
-              <a:rPr/>
-              <a:t>dataset</a:t>
+              <a:t>Inner</a:t>
+            </a:r>
+            <a:r>
+              <a:rPr/>
+              <a:t> </a:t>
+            </a:r>
+            <a:r>
+              <a:rPr/>
+              <a:t>join</a:t>
             </a:r>
           </a:p>
         </p:txBody>
@@ -4318,6 +6634,13 @@
         <p:txBody>
           <a:bodyPr/>
           <a:lstStyle/>
+          <a:p>
+            <a:pPr lvl="1"/>
+            <a:r>
+              <a:rPr/>
+              <a:t>Original table</a:t>
+            </a:r>
+          </a:p>
           <a:p>
             <a:pPr lvl="0" marL="1270000" indent="0">
               <a:buNone/>
@@ -4326,12 +6649,21 @@
               <a:rPr sz="1800">
                 <a:latin typeface="Courier"/>
               </a:rPr>
-              <a:t>##    id sex
-## 1 101   0
-## 2 102   1
-## 3 103   1
-## 4 104   0
-## 5 105   0</a:t>
+              <a:t>first_key first_value 
+A         Andrew      
+B         Benjamin    
+D         David       
+second_key second_value
+A          Amsterdam
+C          Casablanca
+D          Denamrk</a:t>
+            </a:r>
+          </a:p>
+          <a:p>
+            <a:pPr lvl="1"/>
+            <a:r>
+              <a:rPr/>
+              <a:t>Results after inner join</a:t>
             </a:r>
           </a:p>
           <a:p>
@@ -4342,10 +6674,11 @@
               <a:rPr sz="1800">
                 <a:latin typeface="Courier"/>
               </a:rPr>
-              <a:t>##   sex_code     sex_labels
-## 1        0           Male
-## 2        1         Female
-## 3        9 Did not answer</a:t>
+              <a:t>first_key first_value second_key second_value
+A         Andrew      A          Amsterdam
+B         Benjamin    B          Baltimore
+C         Charles     C          Casablanca
+D         David       D          Denamrk</a:t>
             </a:r>
           </a:p>
         </p:txBody>
@@ -4392,7 +6725,47 @@
             </a:pPr>
             <a:r>
               <a:rPr/>
-              <a:t>Conclusion</a:t>
+              <a:t>Four</a:t>
+            </a:r>
+            <a:r>
+              <a:rPr/>
+              <a:t> </a:t>
+            </a:r>
+            <a:r>
+              <a:rPr/>
+              <a:t>basic</a:t>
+            </a:r>
+            <a:r>
+              <a:rPr/>
+              <a:t> </a:t>
+            </a:r>
+            <a:r>
+              <a:rPr/>
+              <a:t>types</a:t>
+            </a:r>
+            <a:r>
+              <a:rPr/>
+              <a:t> </a:t>
+            </a:r>
+            <a:r>
+              <a:rPr/>
+              <a:t>of</a:t>
+            </a:r>
+            <a:r>
+              <a:rPr/>
+              <a:t> </a:t>
+            </a:r>
+            <a:r>
+              <a:rPr/>
+              <a:t>joins</a:t>
+            </a:r>
+            <a:r>
+              <a:rPr/>
+              <a:t> </a:t>
+            </a:r>
+            <a:r>
+              <a:rPr/>
+              <a:t>(2/4)</a:t>
             </a:r>
           </a:p>
         </p:txBody>
@@ -4415,7 +6788,560 @@
             <a:pPr lvl="1"/>
             <a:r>
               <a:rPr/>
-              <a:t>What have you learned.</a:t>
+              <a:t>Left join</a:t>
+            </a:r>
+          </a:p>
+          <a:p>
+            <a:pPr lvl="2"/>
+            <a:r>
+              <a:rPr/>
+              <a:t>Removes mismatches from second database</a:t>
+            </a:r>
+          </a:p>
+          <a:p>
+            <a:pPr lvl="2"/>
+            <a:r>
+              <a:rPr/>
+              <a:t>Keeps mismatches from first database</a:t>
+            </a:r>
+          </a:p>
+          <a:p>
+            <a:pPr lvl="3"/>
+            <a:r>
+              <a:rPr/>
+              <a:t>Second database fields filled with null values</a:t>
+            </a:r>
+          </a:p>
+          <a:p>
+            <a:pPr lvl="2"/>
+            <a:r>
+              <a:rPr/>
+              <a:t>Join order is not too important</a:t>
+            </a:r>
+            <a:br/>
+          </a:p>
+          <a:p>
+            <a:pPr lvl="1"/>
+            <a:r>
+              <a:rPr/>
+              <a:t>SQL code</a:t>
+            </a:r>
+          </a:p>
+          <a:p>
+            <a:pPr lvl="0" marL="1270000" indent="0">
+              <a:buNone/>
+            </a:pPr>
+            <a:r>
+              <a:rPr sz="1800">
+                <a:latin typeface="Courier"/>
+              </a:rPr>
+              <a:t>select * 
+  from first_table as a
+  left join second_table as b
+  on a.first_key=b.second_key</a:t>
+            </a:r>
+          </a:p>
+        </p:txBody>
+      </p:sp>
+    </p:spTree>
+  </p:cSld>
+</p:sld>
+</file>
+
+<file path=ppt/slides/slide6.xml><?xml version="1.0" encoding="utf-8"?>
+<p:sld xmlns:a="http://schemas.openxmlformats.org/drawingml/2006/main" xmlns:r="http://schemas.openxmlformats.org/officeDocument/2006/relationships" xmlns:p="http://schemas.openxmlformats.org/presentationml/2006/main">
+  <p:cSld>
+    <p:spTree>
+      <p:nvGrpSpPr>
+        <p:cNvPr id="1" name=""/>
+        <p:cNvGrpSpPr/>
+        <p:nvPr/>
+      </p:nvGrpSpPr>
+      <p:grpSpPr>
+        <a:xfrm>
+          <a:off x="0" y="0"/>
+          <a:ext cx="0" cy="0"/>
+          <a:chOff x="0" y="0"/>
+          <a:chExt cx="0" cy="0"/>
+        </a:xfrm>
+      </p:grpSpPr>
+      <p:sp>
+        <p:nvSpPr>
+          <p:cNvPr id="2" name="Title 1"/>
+          <p:cNvSpPr>
+            <a:spLocks noGrp="1"/>
+          </p:cNvSpPr>
+          <p:nvPr>
+            <p:ph type="title"/>
+          </p:nvPr>
+        </p:nvSpPr>
+        <p:spPr/>
+        <p:txBody>
+          <a:bodyPr/>
+          <a:lstStyle/>
+          <a:p>
+            <a:pPr lvl="0" marL="0" indent="0">
+              <a:buNone/>
+            </a:pPr>
+            <a:r>
+              <a:rPr/>
+              <a:t>Four</a:t>
+            </a:r>
+            <a:r>
+              <a:rPr/>
+              <a:t> </a:t>
+            </a:r>
+            <a:r>
+              <a:rPr/>
+              <a:t>basic</a:t>
+            </a:r>
+            <a:r>
+              <a:rPr/>
+              <a:t> </a:t>
+            </a:r>
+            <a:r>
+              <a:rPr/>
+              <a:t>types</a:t>
+            </a:r>
+            <a:r>
+              <a:rPr/>
+              <a:t> </a:t>
+            </a:r>
+            <a:r>
+              <a:rPr/>
+              <a:t>of</a:t>
+            </a:r>
+            <a:r>
+              <a:rPr/>
+              <a:t> </a:t>
+            </a:r>
+            <a:r>
+              <a:rPr/>
+              <a:t>joins</a:t>
+            </a:r>
+            <a:r>
+              <a:rPr/>
+              <a:t> </a:t>
+            </a:r>
+            <a:r>
+              <a:rPr/>
+              <a:t>(3/4)</a:t>
+            </a:r>
+          </a:p>
+        </p:txBody>
+      </p:sp>
+      <p:sp>
+        <p:nvSpPr>
+          <p:cNvPr id="3" name="Content Placeholder 2"/>
+          <p:cNvSpPr>
+            <a:spLocks noGrp="1"/>
+          </p:cNvSpPr>
+          <p:nvPr>
+            <p:ph idx="1"/>
+          </p:nvPr>
+        </p:nvSpPr>
+        <p:spPr/>
+        <p:txBody>
+          <a:bodyPr/>
+          <a:lstStyle/>
+          <a:p>
+            <a:pPr lvl="1"/>
+            <a:r>
+              <a:rPr/>
+              <a:t>Right join</a:t>
+            </a:r>
+          </a:p>
+          <a:p>
+            <a:pPr lvl="2"/>
+            <a:r>
+              <a:rPr/>
+              <a:t>Removes mismatches from the first database</a:t>
+            </a:r>
+          </a:p>
+          <a:p>
+            <a:pPr lvl="2"/>
+            <a:r>
+              <a:rPr/>
+              <a:t>Keeps mismatches from the second database</a:t>
+            </a:r>
+          </a:p>
+          <a:p>
+            <a:pPr lvl="3"/>
+            <a:r>
+              <a:rPr/>
+              <a:t>First database fields filled with null values</a:t>
+            </a:r>
+          </a:p>
+        </p:txBody>
+      </p:sp>
+    </p:spTree>
+  </p:cSld>
+</p:sld>
+</file>
+
+<file path=ppt/slides/slide7.xml><?xml version="1.0" encoding="utf-8"?>
+<p:sld xmlns:a="http://schemas.openxmlformats.org/drawingml/2006/main" xmlns:r="http://schemas.openxmlformats.org/officeDocument/2006/relationships" xmlns:p="http://schemas.openxmlformats.org/presentationml/2006/main">
+  <p:cSld>
+    <p:spTree>
+      <p:nvGrpSpPr>
+        <p:cNvPr id="1" name=""/>
+        <p:cNvGrpSpPr/>
+        <p:nvPr/>
+      </p:nvGrpSpPr>
+      <p:grpSpPr>
+        <a:xfrm>
+          <a:off x="0" y="0"/>
+          <a:ext cx="0" cy="0"/>
+          <a:chOff x="0" y="0"/>
+          <a:chExt cx="0" cy="0"/>
+        </a:xfrm>
+      </p:grpSpPr>
+      <p:sp>
+        <p:nvSpPr>
+          <p:cNvPr id="2" name="Title 1"/>
+          <p:cNvSpPr>
+            <a:spLocks noGrp="1"/>
+          </p:cNvSpPr>
+          <p:nvPr>
+            <p:ph type="title"/>
+          </p:nvPr>
+        </p:nvSpPr>
+        <p:spPr/>
+        <p:txBody>
+          <a:bodyPr/>
+          <a:lstStyle/>
+          <a:p>
+            <a:pPr lvl="0" marL="0" indent="0">
+              <a:buNone/>
+            </a:pPr>
+            <a:r>
+              <a:rPr/>
+              <a:t>Four</a:t>
+            </a:r>
+            <a:r>
+              <a:rPr/>
+              <a:t> </a:t>
+            </a:r>
+            <a:r>
+              <a:rPr/>
+              <a:t>basic</a:t>
+            </a:r>
+            <a:r>
+              <a:rPr/>
+              <a:t> </a:t>
+            </a:r>
+            <a:r>
+              <a:rPr/>
+              <a:t>types</a:t>
+            </a:r>
+            <a:r>
+              <a:rPr/>
+              <a:t> </a:t>
+            </a:r>
+            <a:r>
+              <a:rPr/>
+              <a:t>of</a:t>
+            </a:r>
+            <a:r>
+              <a:rPr/>
+              <a:t> </a:t>
+            </a:r>
+            <a:r>
+              <a:rPr/>
+              <a:t>joins</a:t>
+            </a:r>
+            <a:r>
+              <a:rPr/>
+              <a:t> </a:t>
+            </a:r>
+            <a:r>
+              <a:rPr/>
+              <a:t>(4/4)</a:t>
+            </a:r>
+          </a:p>
+        </p:txBody>
+      </p:sp>
+      <p:sp>
+        <p:nvSpPr>
+          <p:cNvPr id="3" name="Content Placeholder 2"/>
+          <p:cNvSpPr>
+            <a:spLocks noGrp="1"/>
+          </p:cNvSpPr>
+          <p:nvPr>
+            <p:ph idx="1"/>
+          </p:nvPr>
+        </p:nvSpPr>
+        <p:spPr/>
+        <p:txBody>
+          <a:bodyPr/>
+          <a:lstStyle/>
+          <a:p>
+            <a:pPr lvl="1"/>
+            <a:r>
+              <a:rPr/>
+              <a:t>Full join, outer join</a:t>
+            </a:r>
+          </a:p>
+          <a:p>
+            <a:pPr lvl="2"/>
+            <a:r>
+              <a:rPr/>
+              <a:t>Keeps mismatches from first database</a:t>
+            </a:r>
+          </a:p>
+          <a:p>
+            <a:pPr lvl="3"/>
+            <a:r>
+              <a:rPr/>
+              <a:t>Second database fields filled with null values</a:t>
+            </a:r>
+          </a:p>
+          <a:p>
+            <a:pPr lvl="2"/>
+            <a:r>
+              <a:rPr/>
+              <a:t>Keeps mismatches from the second database</a:t>
+            </a:r>
+          </a:p>
+          <a:p>
+            <a:pPr lvl="3"/>
+            <a:r>
+              <a:rPr/>
+              <a:t>First database fields filled with null values</a:t>
+            </a:r>
+          </a:p>
+        </p:txBody>
+      </p:sp>
+    </p:spTree>
+  </p:cSld>
+</p:sld>
+</file>
+
+<file path=ppt/slides/slide8.xml><?xml version="1.0" encoding="utf-8"?>
+<p:sld xmlns:a="http://schemas.openxmlformats.org/drawingml/2006/main" xmlns:r="http://schemas.openxmlformats.org/officeDocument/2006/relationships" xmlns:p="http://schemas.openxmlformats.org/presentationml/2006/main">
+  <p:cSld>
+    <p:spTree>
+      <p:nvGrpSpPr>
+        <p:cNvPr id="1" name=""/>
+        <p:cNvGrpSpPr/>
+        <p:nvPr/>
+      </p:nvGrpSpPr>
+      <p:grpSpPr>
+        <a:xfrm>
+          <a:off x="0" y="0"/>
+          <a:ext cx="0" cy="0"/>
+          <a:chOff x="0" y="0"/>
+          <a:chExt cx="0" cy="0"/>
+        </a:xfrm>
+      </p:grpSpPr>
+      <p:sp>
+        <p:nvSpPr>
+          <p:cNvPr id="2" name="Title 1"/>
+          <p:cNvSpPr>
+            <a:spLocks noGrp="1"/>
+          </p:cNvSpPr>
+          <p:nvPr>
+            <p:ph type="title"/>
+          </p:nvPr>
+        </p:nvSpPr>
+        <p:spPr/>
+        <p:txBody>
+          <a:bodyPr/>
+          <a:lstStyle/>
+          <a:p>
+            <a:pPr lvl="0" marL="0" indent="0">
+              <a:buNone/>
+            </a:pPr>
+            <a:r>
+              <a:rPr/>
+              <a:t>unmatched_labels_db,</a:t>
+            </a:r>
+            <a:r>
+              <a:rPr/>
+              <a:t> </a:t>
+            </a:r>
+            <a:r>
+              <a:rPr/>
+              <a:t>listing</a:t>
+            </a:r>
+            <a:r>
+              <a:rPr/>
+              <a:t> </a:t>
+            </a:r>
+            <a:r>
+              <a:rPr/>
+              <a:t>of</a:t>
+            </a:r>
+            <a:r>
+              <a:rPr/>
+              <a:t> </a:t>
+            </a:r>
+            <a:r>
+              <a:rPr/>
+              <a:t>both</a:t>
+            </a:r>
+            <a:r>
+              <a:rPr/>
+              <a:t> </a:t>
+            </a:r>
+            <a:r>
+              <a:rPr/>
+              <a:t>tables</a:t>
+            </a:r>
+          </a:p>
+        </p:txBody>
+      </p:sp>
+      <p:sp>
+        <p:nvSpPr>
+          <p:cNvPr id="3" name="Content Placeholder 2"/>
+          <p:cNvSpPr>
+            <a:spLocks noGrp="1"/>
+          </p:cNvSpPr>
+          <p:nvPr>
+            <p:ph idx="1"/>
+          </p:nvPr>
+        </p:nvSpPr>
+        <p:spPr/>
+        <p:txBody>
+          <a:bodyPr/>
+          <a:lstStyle/>
+          <a:p>
+            <a:pPr lvl="1"/>
+            <a:r>
+              <a:rPr/>
+              <a:t>Listing of results_table</a:t>
+            </a:r>
+          </a:p>
+          <a:p>
+            <a:pPr lvl="0" marL="1270000" indent="0">
+              <a:buNone/>
+            </a:pPr>
+            <a:r>
+              <a:rPr sz="1800">
+                <a:latin typeface="Courier"/>
+              </a:rPr>
+              <a:t>##    id sex
+## 1 101   1
+## 2 102   0
+## 3 103   0
+## 4 104   1
+## 5 105   1</a:t>
+            </a:r>
+          </a:p>
+          <a:p>
+            <a:pPr lvl="1"/>
+            <a:r>
+              <a:rPr/>
+              <a:t>Listing of sex_table</a:t>
+            </a:r>
+          </a:p>
+          <a:p>
+            <a:pPr lvl="0" marL="1270000" indent="0">
+              <a:buNone/>
+            </a:pPr>
+            <a:r>
+              <a:rPr sz="1800">
+                <a:latin typeface="Courier"/>
+              </a:rPr>
+              <a:t>##   sex_code      sex_label
+## 1        0           Male
+## 2        1         Female
+## 3        9 Did not answer</a:t>
+            </a:r>
+          </a:p>
+        </p:txBody>
+      </p:sp>
+    </p:spTree>
+  </p:cSld>
+</p:sld>
+</file>
+
+<file path=ppt/slides/slide9.xml><?xml version="1.0" encoding="utf-8"?>
+<p:sld xmlns:a="http://schemas.openxmlformats.org/drawingml/2006/main" xmlns:r="http://schemas.openxmlformats.org/officeDocument/2006/relationships" xmlns:p="http://schemas.openxmlformats.org/presentationml/2006/main">
+  <p:cSld>
+    <p:spTree>
+      <p:nvGrpSpPr>
+        <p:cNvPr id="1" name=""/>
+        <p:cNvGrpSpPr/>
+        <p:nvPr/>
+      </p:nvGrpSpPr>
+      <p:grpSpPr>
+        <a:xfrm>
+          <a:off x="0" y="0"/>
+          <a:ext cx="0" cy="0"/>
+          <a:chOff x="0" y="0"/>
+          <a:chExt cx="0" cy="0"/>
+        </a:xfrm>
+      </p:grpSpPr>
+      <p:sp>
+        <p:nvSpPr>
+          <p:cNvPr id="2" name="Title 1"/>
+          <p:cNvSpPr>
+            <a:spLocks noGrp="1"/>
+          </p:cNvSpPr>
+          <p:nvPr>
+            <p:ph type="title"/>
+          </p:nvPr>
+        </p:nvSpPr>
+        <p:spPr/>
+        <p:txBody>
+          <a:bodyPr/>
+          <a:lstStyle/>
+          <a:p>
+            <a:pPr lvl="0" marL="0" indent="0">
+              <a:buNone/>
+            </a:pPr>
+            <a:r>
+              <a:rPr/>
+              <a:t>unmatched_labels_db,</a:t>
+            </a:r>
+            <a:r>
+              <a:rPr/>
+              <a:t> </a:t>
+            </a:r>
+            <a:r>
+              <a:rPr/>
+              <a:t>exclude</a:t>
+            </a:r>
+            <a:r>
+              <a:rPr/>
+              <a:t> </a:t>
+            </a:r>
+            <a:r>
+              <a:rPr/>
+              <a:t>mismatch</a:t>
+            </a:r>
+          </a:p>
+        </p:txBody>
+      </p:sp>
+      <p:sp>
+        <p:nvSpPr>
+          <p:cNvPr id="3" name="Content Placeholder 2"/>
+          <p:cNvSpPr>
+            <a:spLocks noGrp="1"/>
+          </p:cNvSpPr>
+          <p:nvPr>
+            <p:ph idx="1"/>
+          </p:nvPr>
+        </p:nvSpPr>
+        <p:spPr/>
+        <p:txBody>
+          <a:bodyPr/>
+          <a:lstStyle/>
+          <a:p>
+            <a:pPr lvl="0" marL="1270000" indent="0">
+              <a:buNone/>
+            </a:pPr>
+            <a:r>
+              <a:rPr sz="1800">
+                <a:latin typeface="Courier"/>
+              </a:rPr>
+              <a:t>##    id sex sex_code sex_label
+## 1 101   1        1    Female
+## 2 102   0        0      Male
+## 3 103   0        0      Male
+## 4 104   1        1    Female
+## 5 105   1        1    Female</a:t>
             </a:r>
           </a:p>
         </p:txBody>

</xml_diff>